<commit_message>
Alis bmscs in docu
</commit_message>
<xml_diff>
--- a/Dokumentation/Iteration2/II._Iteration_Praesentation.pptx
+++ b/Dokumentation/Iteration2/II._Iteration_Praesentation.pptx
@@ -5,7 +5,7 @@
     <p:sldMasterId id="2147483648" r:id="rId1"/>
   </p:sldMasterIdLst>
   <p:notesMasterIdLst>
-    <p:notesMasterId r:id="rId17"/>
+    <p:notesMasterId r:id="rId18"/>
   </p:notesMasterIdLst>
   <p:sldIdLst>
     <p:sldId id="256" r:id="rId2"/>
@@ -22,7 +22,8 @@
     <p:sldId id="262" r:id="rId13"/>
     <p:sldId id="271" r:id="rId14"/>
     <p:sldId id="272" r:id="rId15"/>
-    <p:sldId id="269" r:id="rId16"/>
+    <p:sldId id="275" r:id="rId16"/>
+    <p:sldId id="269" r:id="rId17"/>
   </p:sldIdLst>
   <p:sldSz cx="12192000" cy="6858000"/>
   <p:notesSz cx="6858000" cy="9144000"/>
@@ -211,7 +212,7 @@
           <a:p>
             <a:fld id="{87497AB7-969D-4033-A0A8-45BBACA51A29}" type="datetimeFigureOut">
               <a:rPr lang="de-DE" smtClean="0"/>
-              <a:t>08.12.2018</a:t>
+              <a:t>09.12.2018</a:t>
             </a:fld>
             <a:endParaRPr lang="de-DE"/>
           </a:p>
@@ -625,7 +626,7 @@
           <a:p>
             <a:fld id="{B65A26E1-B758-4544-A930-BA1AE641F7CF}" type="datetime1">
               <a:rPr lang="de-DE" smtClean="0"/>
-              <a:t>08.12.2018</a:t>
+              <a:t>09.12.2018</a:t>
             </a:fld>
             <a:endParaRPr lang="de-DE"/>
           </a:p>
@@ -823,7 +824,7 @@
           <a:p>
             <a:fld id="{AEB5513F-57F3-404D-B984-9F6C1313D326}" type="datetime1">
               <a:rPr lang="de-DE" smtClean="0"/>
-              <a:t>08.12.2018</a:t>
+              <a:t>09.12.2018</a:t>
             </a:fld>
             <a:endParaRPr lang="de-DE"/>
           </a:p>
@@ -1031,7 +1032,7 @@
           <a:p>
             <a:fld id="{DC1E3C0C-1083-4096-B8DE-15CA16027086}" type="datetime1">
               <a:rPr lang="de-DE" smtClean="0"/>
-              <a:t>08.12.2018</a:t>
+              <a:t>09.12.2018</a:t>
             </a:fld>
             <a:endParaRPr lang="de-DE"/>
           </a:p>
@@ -1229,7 +1230,7 @@
           <a:p>
             <a:fld id="{2CCAA208-1910-481C-A0EF-F34E42D00268}" type="datetime1">
               <a:rPr lang="de-DE" smtClean="0"/>
-              <a:t>08.12.2018</a:t>
+              <a:t>09.12.2018</a:t>
             </a:fld>
             <a:endParaRPr lang="de-DE"/>
           </a:p>
@@ -1504,7 +1505,7 @@
           <a:p>
             <a:fld id="{38E5A416-D6B9-4C8E-8284-BB9D2E55CDF7}" type="datetime1">
               <a:rPr lang="de-DE" smtClean="0"/>
-              <a:t>08.12.2018</a:t>
+              <a:t>09.12.2018</a:t>
             </a:fld>
             <a:endParaRPr lang="de-DE"/>
           </a:p>
@@ -1769,7 +1770,7 @@
           <a:p>
             <a:fld id="{62A83026-597F-45FA-84C7-6F2B34FD9E1E}" type="datetime1">
               <a:rPr lang="de-DE" smtClean="0"/>
-              <a:t>08.12.2018</a:t>
+              <a:t>09.12.2018</a:t>
             </a:fld>
             <a:endParaRPr lang="de-DE"/>
           </a:p>
@@ -2181,7 +2182,7 @@
           <a:p>
             <a:fld id="{390F5D83-6C46-4BE6-8773-302A179F7CB7}" type="datetime1">
               <a:rPr lang="de-DE" smtClean="0"/>
-              <a:t>08.12.2018</a:t>
+              <a:t>09.12.2018</a:t>
             </a:fld>
             <a:endParaRPr lang="de-DE"/>
           </a:p>
@@ -2322,7 +2323,7 @@
           <a:p>
             <a:fld id="{B4A51B1B-9692-4126-8BE1-578C704F6A2F}" type="datetime1">
               <a:rPr lang="de-DE" smtClean="0"/>
-              <a:t>08.12.2018</a:t>
+              <a:t>09.12.2018</a:t>
             </a:fld>
             <a:endParaRPr lang="de-DE"/>
           </a:p>
@@ -2435,7 +2436,7 @@
           <a:p>
             <a:fld id="{899545E2-B7E0-4925-89E5-D07A7B7A663E}" type="datetime1">
               <a:rPr lang="de-DE" smtClean="0"/>
-              <a:t>08.12.2018</a:t>
+              <a:t>09.12.2018</a:t>
             </a:fld>
             <a:endParaRPr lang="de-DE"/>
           </a:p>
@@ -2746,7 +2747,7 @@
           <a:p>
             <a:fld id="{42C93042-0A83-4F9C-9A17-F9995D857659}" type="datetime1">
               <a:rPr lang="de-DE" smtClean="0"/>
-              <a:t>08.12.2018</a:t>
+              <a:t>09.12.2018</a:t>
             </a:fld>
             <a:endParaRPr lang="de-DE"/>
           </a:p>
@@ -3034,7 +3035,7 @@
           <a:p>
             <a:fld id="{F395E9DE-0A6B-48E7-8BE1-4D85C485520A}" type="datetime1">
               <a:rPr lang="de-DE" smtClean="0"/>
-              <a:t>08.12.2018</a:t>
+              <a:t>09.12.2018</a:t>
             </a:fld>
             <a:endParaRPr lang="de-DE"/>
           </a:p>
@@ -3275,7 +3276,7 @@
           <a:p>
             <a:fld id="{19DB62EF-FBBE-497E-8ECB-76624E3D8A7C}" type="datetime1">
               <a:rPr lang="de-DE" smtClean="0"/>
-              <a:t>08.12.2018</a:t>
+              <a:t>09.12.2018</a:t>
             </a:fld>
             <a:endParaRPr lang="de-DE"/>
           </a:p>
@@ -3840,7 +3841,7 @@
             </a:r>
             <a:r>
               <a:rPr lang="de-DE" dirty="0"/>
-              <a:t> (2/6)</a:t>
+              <a:t> (2/7)</a:t>
             </a:r>
           </a:p>
         </p:txBody>
@@ -4044,7 +4045,7 @@
             </a:r>
             <a:r>
               <a:rPr lang="de-DE" dirty="0"/>
-              <a:t> (3/6)</a:t>
+              <a:t> (3/7)</a:t>
             </a:r>
           </a:p>
         </p:txBody>
@@ -4242,7 +4243,7 @@
             </a:r>
             <a:r>
               <a:rPr lang="de-DE" dirty="0"/>
-              <a:t> (4/6)</a:t>
+              <a:t> (4/7)</a:t>
             </a:r>
           </a:p>
         </p:txBody>
@@ -4447,7 +4448,7 @@
             </a:r>
             <a:r>
               <a:rPr lang="de-DE" dirty="0"/>
-              <a:t> (5/6)</a:t>
+              <a:t> (5/7)</a:t>
             </a:r>
           </a:p>
         </p:txBody>
@@ -4682,7 +4683,7 @@
             </a:r>
             <a:r>
               <a:rPr lang="de-DE" dirty="0"/>
-              <a:t> (6/6)</a:t>
+              <a:t> (6/7)</a:t>
             </a:r>
           </a:p>
         </p:txBody>
@@ -4853,7 +4854,7 @@
           <p:cNvPr id="2" name="Titel 1">
             <a:extLst>
               <a:ext uri="{FF2B5EF4-FFF2-40B4-BE49-F238E27FC236}">
-                <a16:creationId xmlns:a16="http://schemas.microsoft.com/office/drawing/2014/main" id="{A5DCDCB1-6F66-4E70-AA84-6AC4150AC41C}"/>
+                <a16:creationId xmlns:a16="http://schemas.microsoft.com/office/drawing/2014/main" id="{190DC1C8-46B2-4CBC-845B-4ED2A6D17DCE}"/>
               </a:ext>
             </a:extLst>
           </p:cNvPr>
@@ -4871,9 +4872,47 @@
           <a:p>
             <a:r>
               <a:rPr lang="de-DE" dirty="0" err="1"/>
-              <a:t>hMSC</a:t>
-            </a:r>
-            <a:endParaRPr lang="de-DE" dirty="0"/>
+              <a:t>bMSCs</a:t>
+            </a:r>
+            <a:r>
+              <a:rPr lang="de-DE" dirty="0"/>
+              <a:t> (7/7)</a:t>
+            </a:r>
+          </a:p>
+        </p:txBody>
+      </p:sp>
+      <p:sp>
+        <p:nvSpPr>
+          <p:cNvPr id="3" name="Inhaltsplatzhalter 2">
+            <a:extLst>
+              <a:ext uri="{FF2B5EF4-FFF2-40B4-BE49-F238E27FC236}">
+                <a16:creationId xmlns:a16="http://schemas.microsoft.com/office/drawing/2014/main" id="{78842A80-7C63-4FB3-8C0D-D0B2AFD44518}"/>
+              </a:ext>
+            </a:extLst>
+          </p:cNvPr>
+          <p:cNvSpPr>
+            <a:spLocks noGrp="1"/>
+          </p:cNvSpPr>
+          <p:nvPr>
+            <p:ph idx="1"/>
+          </p:nvPr>
+        </p:nvSpPr>
+        <p:spPr/>
+        <p:txBody>
+          <a:bodyPr/>
+          <a:lstStyle/>
+          <a:p>
+            <a:pPr marL="0" indent="0">
+              <a:buNone/>
+            </a:pPr>
+            <a:r>
+              <a:rPr lang="de-DE" dirty="0" err="1"/>
+              <a:t>Timetable</a:t>
+            </a:r>
+            <a:r>
+              <a:rPr lang="de-DE" dirty="0"/>
+              <a:t> erstellen</a:t>
+            </a:r>
           </a:p>
         </p:txBody>
       </p:sp>
@@ -4882,7 +4921,7 @@
           <p:cNvPr id="4" name="Foliennummernplatzhalter 3">
             <a:extLst>
               <a:ext uri="{FF2B5EF4-FFF2-40B4-BE49-F238E27FC236}">
-                <a16:creationId xmlns:a16="http://schemas.microsoft.com/office/drawing/2014/main" id="{12B98F94-C8BC-4971-A003-B025AD3C127D}"/>
+                <a16:creationId xmlns:a16="http://schemas.microsoft.com/office/drawing/2014/main" id="{8DE23200-B097-4035-A199-95AD4279C717}"/>
               </a:ext>
             </a:extLst>
           </p:cNvPr>
@@ -4901,6 +4940,179 @@
             <a:fld id="{0E805572-8E5C-4FE5-A106-39EEE8227A5E}" type="slidenum">
               <a:rPr lang="de-DE" smtClean="0"/>
               <a:t>15</a:t>
+            </a:fld>
+            <a:endParaRPr lang="de-DE"/>
+          </a:p>
+        </p:txBody>
+      </p:sp>
+      <p:sp>
+        <p:nvSpPr>
+          <p:cNvPr id="7" name="Fußzeilenplatzhalter 6">
+            <a:extLst>
+              <a:ext uri="{FF2B5EF4-FFF2-40B4-BE49-F238E27FC236}">
+                <a16:creationId xmlns:a16="http://schemas.microsoft.com/office/drawing/2014/main" id="{DD4C51CF-18A4-4A2A-A336-45BB768664C7}"/>
+              </a:ext>
+            </a:extLst>
+          </p:cNvPr>
+          <p:cNvSpPr>
+            <a:spLocks noGrp="1"/>
+          </p:cNvSpPr>
+          <p:nvPr>
+            <p:ph type="ftr" sz="quarter" idx="11"/>
+          </p:nvPr>
+        </p:nvSpPr>
+        <p:spPr>
+          <a:xfrm>
+            <a:off x="838200" y="6356349"/>
+            <a:ext cx="4114800" cy="365125"/>
+          </a:xfrm>
+        </p:spPr>
+        <p:txBody>
+          <a:bodyPr/>
+          <a:lstStyle/>
+          <a:p>
+            <a:pPr algn="l"/>
+            <a:r>
+              <a:rPr lang="de-DE" dirty="0"/>
+              <a:t>Alisan </a:t>
+            </a:r>
+            <a:r>
+              <a:rPr lang="de-DE" dirty="0" err="1"/>
+              <a:t>Gündogan</a:t>
+            </a:r>
+            <a:r>
+              <a:rPr lang="de-DE" dirty="0"/>
+              <a:t> </a:t>
+            </a:r>
+          </a:p>
+          <a:p>
+            <a:pPr algn="l"/>
+            <a:r>
+              <a:rPr lang="de-DE" dirty="0"/>
+              <a:t> </a:t>
+            </a:r>
+          </a:p>
+        </p:txBody>
+      </p:sp>
+      <p:pic>
+        <p:nvPicPr>
+          <p:cNvPr id="6" name="Grafik 5">
+            <a:extLst>
+              <a:ext uri="{FF2B5EF4-FFF2-40B4-BE49-F238E27FC236}">
+                <a16:creationId xmlns:a16="http://schemas.microsoft.com/office/drawing/2014/main" id="{80D514B9-377D-4D38-B7D1-E7B9247F241E}"/>
+              </a:ext>
+            </a:extLst>
+          </p:cNvPr>
+          <p:cNvPicPr>
+            <a:picLocks noChangeAspect="1"/>
+          </p:cNvPicPr>
+          <p:nvPr/>
+        </p:nvPicPr>
+        <p:blipFill>
+          <a:blip r:embed="rId2">
+            <a:extLst>
+              <a:ext uri="{28A0092B-C50C-407E-A947-70E740481C1C}">
+                <a14:useLocalDpi xmlns:a14="http://schemas.microsoft.com/office/drawing/2010/main" val="0"/>
+              </a:ext>
+            </a:extLst>
+          </a:blip>
+          <a:stretch>
+            <a:fillRect/>
+          </a:stretch>
+        </p:blipFill>
+        <p:spPr>
+          <a:xfrm>
+            <a:off x="6059970" y="136524"/>
+            <a:ext cx="4653891" cy="6721475"/>
+          </a:xfrm>
+          <a:prstGeom prst="rect">
+            <a:avLst/>
+          </a:prstGeom>
+        </p:spPr>
+      </p:pic>
+    </p:spTree>
+    <p:extLst>
+      <p:ext uri="{BB962C8B-B14F-4D97-AF65-F5344CB8AC3E}">
+        <p14:creationId xmlns:p14="http://schemas.microsoft.com/office/powerpoint/2010/main" val="1634783217"/>
+      </p:ext>
+    </p:extLst>
+  </p:cSld>
+  <p:clrMapOvr>
+    <a:masterClrMapping/>
+  </p:clrMapOvr>
+</p:sld>
+</file>
+
+<file path=ppt/slides/slide16.xml><?xml version="1.0" encoding="utf-8"?>
+<p:sld xmlns:a="http://schemas.openxmlformats.org/drawingml/2006/main" xmlns:r="http://schemas.openxmlformats.org/officeDocument/2006/relationships" xmlns:p="http://schemas.openxmlformats.org/presentationml/2006/main">
+  <p:cSld>
+    <p:spTree>
+      <p:nvGrpSpPr>
+        <p:cNvPr id="1" name=""/>
+        <p:cNvGrpSpPr/>
+        <p:nvPr/>
+      </p:nvGrpSpPr>
+      <p:grpSpPr>
+        <a:xfrm>
+          <a:off x="0" y="0"/>
+          <a:ext cx="0" cy="0"/>
+          <a:chOff x="0" y="0"/>
+          <a:chExt cx="0" cy="0"/>
+        </a:xfrm>
+      </p:grpSpPr>
+      <p:sp>
+        <p:nvSpPr>
+          <p:cNvPr id="2" name="Titel 1">
+            <a:extLst>
+              <a:ext uri="{FF2B5EF4-FFF2-40B4-BE49-F238E27FC236}">
+                <a16:creationId xmlns:a16="http://schemas.microsoft.com/office/drawing/2014/main" id="{A5DCDCB1-6F66-4E70-AA84-6AC4150AC41C}"/>
+              </a:ext>
+            </a:extLst>
+          </p:cNvPr>
+          <p:cNvSpPr>
+            <a:spLocks noGrp="1"/>
+          </p:cNvSpPr>
+          <p:nvPr>
+            <p:ph type="title"/>
+          </p:nvPr>
+        </p:nvSpPr>
+        <p:spPr/>
+        <p:txBody>
+          <a:bodyPr/>
+          <a:lstStyle/>
+          <a:p>
+            <a:r>
+              <a:rPr lang="de-DE" dirty="0" err="1"/>
+              <a:t>hMSC</a:t>
+            </a:r>
+            <a:endParaRPr lang="de-DE" dirty="0"/>
+          </a:p>
+        </p:txBody>
+      </p:sp>
+      <p:sp>
+        <p:nvSpPr>
+          <p:cNvPr id="4" name="Foliennummernplatzhalter 3">
+            <a:extLst>
+              <a:ext uri="{FF2B5EF4-FFF2-40B4-BE49-F238E27FC236}">
+                <a16:creationId xmlns:a16="http://schemas.microsoft.com/office/drawing/2014/main" id="{12B98F94-C8BC-4971-A003-B025AD3C127D}"/>
+              </a:ext>
+            </a:extLst>
+          </p:cNvPr>
+          <p:cNvSpPr>
+            <a:spLocks noGrp="1"/>
+          </p:cNvSpPr>
+          <p:nvPr>
+            <p:ph type="sldNum" sz="quarter" idx="12"/>
+          </p:nvPr>
+        </p:nvSpPr>
+        <p:spPr/>
+        <p:txBody>
+          <a:bodyPr/>
+          <a:lstStyle/>
+          <a:p>
+            <a:fld id="{0E805572-8E5C-4FE5-A106-39EEE8227A5E}" type="slidenum">
+              <a:rPr lang="de-DE" smtClean="0"/>
+              <a:t>16</a:t>
             </a:fld>
             <a:endParaRPr lang="de-DE"/>
           </a:p>
@@ -5205,7 +5417,7 @@
           <a:p>
             <a:r>
               <a:rPr lang="de-DE" dirty="0"/>
-              <a:t>User Stories(1/4)</a:t>
+              <a:t>User Stories(1/6)</a:t>
             </a:r>
           </a:p>
         </p:txBody>
@@ -5404,7 +5616,7 @@
           <a:p>
             <a:r>
               <a:rPr lang="de-DE" dirty="0"/>
-              <a:t>User Stories(2/4)</a:t>
+              <a:t>User Stories(2/6)</a:t>
             </a:r>
           </a:p>
         </p:txBody>
@@ -5890,13 +6102,8 @@
             <a:pPr algn="l"/>
             <a:r>
               <a:rPr lang="de-DE" dirty="0"/>
-              <a:t>Dave </a:t>
-            </a:r>
-            <a:r>
-              <a:rPr lang="de-DE" dirty="0" err="1"/>
-              <a:t>Makila</a:t>
-            </a:r>
-            <a:endParaRPr lang="de-DE" dirty="0"/>
+              <a:t>Andreas Häusler</a:t>
+            </a:r>
           </a:p>
         </p:txBody>
       </p:sp>
@@ -6381,7 +6588,7 @@
             </a:r>
             <a:r>
               <a:rPr lang="de-DE" dirty="0"/>
-              <a:t> (1/6)</a:t>
+              <a:t> (1/7)</a:t>
             </a:r>
           </a:p>
         </p:txBody>

</xml_diff>

<commit_message>
smaller fixes like typos and sequence
</commit_message>
<xml_diff>
--- a/Dokumentation/Iteration2/II._Iteration_Praesentation.pptx
+++ b/Dokumentation/Iteration2/II._Iteration_Praesentation.pptx
@@ -5,7 +5,7 @@
     <p:sldMasterId id="2147483648" r:id="rId1"/>
   </p:sldMasterIdLst>
   <p:notesMasterIdLst>
-    <p:notesMasterId r:id="rId18"/>
+    <p:notesMasterId r:id="rId19"/>
   </p:notesMasterIdLst>
   <p:sldIdLst>
     <p:sldId id="256" r:id="rId2"/>
@@ -16,14 +16,15 @@
     <p:sldId id="268" r:id="rId7"/>
     <p:sldId id="273" r:id="rId8"/>
     <p:sldId id="274" r:id="rId9"/>
-    <p:sldId id="259" r:id="rId10"/>
-    <p:sldId id="260" r:id="rId11"/>
-    <p:sldId id="261" r:id="rId12"/>
-    <p:sldId id="262" r:id="rId13"/>
+    <p:sldId id="276" r:id="rId10"/>
+    <p:sldId id="259" r:id="rId11"/>
+    <p:sldId id="260" r:id="rId12"/>
+    <p:sldId id="261" r:id="rId13"/>
     <p:sldId id="271" r:id="rId14"/>
-    <p:sldId id="272" r:id="rId15"/>
-    <p:sldId id="275" r:id="rId16"/>
-    <p:sldId id="269" r:id="rId17"/>
+    <p:sldId id="275" r:id="rId15"/>
+    <p:sldId id="262" r:id="rId16"/>
+    <p:sldId id="272" r:id="rId17"/>
+    <p:sldId id="269" r:id="rId18"/>
   </p:sldIdLst>
   <p:sldSz cx="12192000" cy="6858000"/>
   <p:notesSz cx="6858000" cy="9144000"/>
@@ -3830,6 +3831,213 @@
             <p:ph type="title"/>
           </p:nvPr>
         </p:nvSpPr>
+        <p:spPr>
+          <a:xfrm>
+            <a:off x="838200" y="365125"/>
+            <a:ext cx="10515600" cy="1325563"/>
+          </a:xfrm>
+        </p:spPr>
+        <p:txBody>
+          <a:bodyPr/>
+          <a:lstStyle/>
+          <a:p>
+            <a:r>
+              <a:rPr lang="de-DE" dirty="0" err="1"/>
+              <a:t>bMSCs</a:t>
+            </a:r>
+            <a:r>
+              <a:rPr lang="de-DE" dirty="0"/>
+              <a:t> (1/7)</a:t>
+            </a:r>
+          </a:p>
+        </p:txBody>
+      </p:sp>
+      <p:sp>
+        <p:nvSpPr>
+          <p:cNvPr id="3" name="Inhaltsplatzhalter 2">
+            <a:extLst>
+              <a:ext uri="{FF2B5EF4-FFF2-40B4-BE49-F238E27FC236}">
+                <a16:creationId xmlns:a16="http://schemas.microsoft.com/office/drawing/2014/main" id="{78842A80-7C63-4FB3-8C0D-D0B2AFD44518}"/>
+              </a:ext>
+            </a:extLst>
+          </p:cNvPr>
+          <p:cNvSpPr>
+            <a:spLocks noGrp="1"/>
+          </p:cNvSpPr>
+          <p:nvPr>
+            <p:ph idx="1"/>
+          </p:nvPr>
+        </p:nvSpPr>
+        <p:spPr>
+          <a:xfrm>
+            <a:off x="838200" y="1825625"/>
+            <a:ext cx="10515600" cy="4351338"/>
+          </a:xfrm>
+        </p:spPr>
+        <p:txBody>
+          <a:bodyPr/>
+          <a:lstStyle/>
+          <a:p>
+            <a:pPr marL="0" indent="0">
+              <a:buNone/>
+            </a:pPr>
+            <a:r>
+              <a:rPr lang="de-DE" dirty="0"/>
+              <a:t>Registrieren</a:t>
+            </a:r>
+          </a:p>
+        </p:txBody>
+      </p:sp>
+      <p:sp>
+        <p:nvSpPr>
+          <p:cNvPr id="4" name="Foliennummernplatzhalter 3">
+            <a:extLst>
+              <a:ext uri="{FF2B5EF4-FFF2-40B4-BE49-F238E27FC236}">
+                <a16:creationId xmlns:a16="http://schemas.microsoft.com/office/drawing/2014/main" id="{34FA1B3A-EF20-4949-AFED-A74DC82A279F}"/>
+              </a:ext>
+            </a:extLst>
+          </p:cNvPr>
+          <p:cNvSpPr>
+            <a:spLocks noGrp="1"/>
+          </p:cNvSpPr>
+          <p:nvPr>
+            <p:ph type="sldNum" sz="quarter" idx="12"/>
+          </p:nvPr>
+        </p:nvSpPr>
+        <p:spPr>
+          <a:xfrm>
+            <a:off x="8610600" y="6356350"/>
+            <a:ext cx="2743200" cy="365125"/>
+          </a:xfrm>
+        </p:spPr>
+        <p:txBody>
+          <a:bodyPr/>
+          <a:lstStyle/>
+          <a:p>
+            <a:fld id="{0E805572-8E5C-4FE5-A106-39EEE8227A5E}" type="slidenum">
+              <a:rPr lang="de-DE" smtClean="0"/>
+              <a:t>10</a:t>
+            </a:fld>
+            <a:endParaRPr lang="de-DE"/>
+          </a:p>
+        </p:txBody>
+      </p:sp>
+      <p:sp>
+        <p:nvSpPr>
+          <p:cNvPr id="9" name="Fußzeilenplatzhalter 6">
+            <a:extLst>
+              <a:ext uri="{FF2B5EF4-FFF2-40B4-BE49-F238E27FC236}">
+                <a16:creationId xmlns:a16="http://schemas.microsoft.com/office/drawing/2014/main" id="{DF560FDE-54AD-4544-8B62-83304D790545}"/>
+              </a:ext>
+            </a:extLst>
+          </p:cNvPr>
+          <p:cNvSpPr>
+            <a:spLocks noGrp="1"/>
+          </p:cNvSpPr>
+          <p:nvPr>
+            <p:ph type="ftr" sz="quarter" idx="11"/>
+          </p:nvPr>
+        </p:nvSpPr>
+        <p:spPr>
+          <a:xfrm>
+            <a:off x="838200" y="6356349"/>
+            <a:ext cx="4114800" cy="365125"/>
+          </a:xfrm>
+        </p:spPr>
+        <p:txBody>
+          <a:bodyPr/>
+          <a:lstStyle/>
+          <a:p>
+            <a:pPr algn="l"/>
+            <a:r>
+              <a:rPr lang="de-DE" dirty="0"/>
+              <a:t>Tobias Sieber</a:t>
+            </a:r>
+          </a:p>
+        </p:txBody>
+      </p:sp>
+      <p:pic>
+        <p:nvPicPr>
+          <p:cNvPr id="7" name="Grafik 6">
+            <a:extLst>
+              <a:ext uri="{FF2B5EF4-FFF2-40B4-BE49-F238E27FC236}">
+                <a16:creationId xmlns:a16="http://schemas.microsoft.com/office/drawing/2014/main" id="{FD44DF95-6A2A-49CA-BB30-55C6CAC08931}"/>
+              </a:ext>
+            </a:extLst>
+          </p:cNvPr>
+          <p:cNvPicPr>
+            <a:picLocks noChangeAspect="1"/>
+          </p:cNvPicPr>
+          <p:nvPr/>
+        </p:nvPicPr>
+        <p:blipFill>
+          <a:blip r:embed="rId2">
+            <a:extLst>
+              <a:ext uri="{28A0092B-C50C-407E-A947-70E740481C1C}">
+                <a14:useLocalDpi xmlns:a14="http://schemas.microsoft.com/office/drawing/2010/main" val="0"/>
+              </a:ext>
+            </a:extLst>
+          </a:blip>
+          <a:stretch>
+            <a:fillRect/>
+          </a:stretch>
+        </p:blipFill>
+        <p:spPr>
+          <a:xfrm>
+            <a:off x="4127399" y="988291"/>
+            <a:ext cx="4628674" cy="4860517"/>
+          </a:xfrm>
+          <a:prstGeom prst="rect">
+            <a:avLst/>
+          </a:prstGeom>
+        </p:spPr>
+      </p:pic>
+    </p:spTree>
+    <p:extLst>
+      <p:ext uri="{BB962C8B-B14F-4D97-AF65-F5344CB8AC3E}">
+        <p14:creationId xmlns:p14="http://schemas.microsoft.com/office/powerpoint/2010/main" val="1804929264"/>
+      </p:ext>
+    </p:extLst>
+  </p:cSld>
+  <p:clrMapOvr>
+    <a:masterClrMapping/>
+  </p:clrMapOvr>
+</p:sld>
+</file>
+
+<file path=ppt/slides/slide11.xml><?xml version="1.0" encoding="utf-8"?>
+<p:sld xmlns:a="http://schemas.openxmlformats.org/drawingml/2006/main" xmlns:r="http://schemas.openxmlformats.org/officeDocument/2006/relationships" xmlns:p="http://schemas.openxmlformats.org/presentationml/2006/main">
+  <p:cSld>
+    <p:spTree>
+      <p:nvGrpSpPr>
+        <p:cNvPr id="1" name=""/>
+        <p:cNvGrpSpPr/>
+        <p:nvPr/>
+      </p:nvGrpSpPr>
+      <p:grpSpPr>
+        <a:xfrm>
+          <a:off x="0" y="0"/>
+          <a:ext cx="0" cy="0"/>
+          <a:chOff x="0" y="0"/>
+          <a:chExt cx="0" cy="0"/>
+        </a:xfrm>
+      </p:grpSpPr>
+      <p:sp>
+        <p:nvSpPr>
+          <p:cNvPr id="2" name="Titel 1">
+            <a:extLst>
+              <a:ext uri="{FF2B5EF4-FFF2-40B4-BE49-F238E27FC236}">
+                <a16:creationId xmlns:a16="http://schemas.microsoft.com/office/drawing/2014/main" id="{190DC1C8-46B2-4CBC-845B-4ED2A6D17DCE}"/>
+              </a:ext>
+            </a:extLst>
+          </p:cNvPr>
+          <p:cNvSpPr>
+            <a:spLocks noGrp="1"/>
+          </p:cNvSpPr>
+          <p:nvPr>
+            <p:ph type="title"/>
+          </p:nvPr>
+        </p:nvSpPr>
         <p:spPr/>
         <p:txBody>
           <a:bodyPr/>
@@ -3907,7 +4115,7 @@
           <a:p>
             <a:fld id="{0E805572-8E5C-4FE5-A106-39EEE8227A5E}" type="slidenum">
               <a:rPr lang="de-DE" smtClean="0"/>
-              <a:t>10</a:t>
+              <a:t>11</a:t>
             </a:fld>
             <a:endParaRPr lang="de-DE"/>
           </a:p>
@@ -4001,7 +4209,7 @@
 </p:sld>
 </file>
 
-<file path=ppt/slides/slide11.xml><?xml version="1.0" encoding="utf-8"?>
+<file path=ppt/slides/slide12.xml><?xml version="1.0" encoding="utf-8"?>
 <p:sld xmlns:a="http://schemas.openxmlformats.org/drawingml/2006/main" xmlns:r="http://schemas.openxmlformats.org/officeDocument/2006/relationships" xmlns:p="http://schemas.openxmlformats.org/presentationml/2006/main">
   <p:cSld>
     <p:spTree>
@@ -4110,7 +4318,7 @@
           <a:p>
             <a:fld id="{0E805572-8E5C-4FE5-A106-39EEE8227A5E}" type="slidenum">
               <a:rPr lang="de-DE" smtClean="0"/>
-              <a:t>11</a:t>
+              <a:t>12</a:t>
             </a:fld>
             <a:endParaRPr lang="de-DE"/>
           </a:p>
@@ -4199,211 +4407,6 @@
 </p:sld>
 </file>
 
-<file path=ppt/slides/slide12.xml><?xml version="1.0" encoding="utf-8"?>
-<p:sld xmlns:a="http://schemas.openxmlformats.org/drawingml/2006/main" xmlns:r="http://schemas.openxmlformats.org/officeDocument/2006/relationships" xmlns:p="http://schemas.openxmlformats.org/presentationml/2006/main">
-  <p:cSld>
-    <p:spTree>
-      <p:nvGrpSpPr>
-        <p:cNvPr id="1" name=""/>
-        <p:cNvGrpSpPr/>
-        <p:nvPr/>
-      </p:nvGrpSpPr>
-      <p:grpSpPr>
-        <a:xfrm>
-          <a:off x="0" y="0"/>
-          <a:ext cx="0" cy="0"/>
-          <a:chOff x="0" y="0"/>
-          <a:chExt cx="0" cy="0"/>
-        </a:xfrm>
-      </p:grpSpPr>
-      <p:sp>
-        <p:nvSpPr>
-          <p:cNvPr id="2" name="Titel 1">
-            <a:extLst>
-              <a:ext uri="{FF2B5EF4-FFF2-40B4-BE49-F238E27FC236}">
-                <a16:creationId xmlns:a16="http://schemas.microsoft.com/office/drawing/2014/main" id="{190DC1C8-46B2-4CBC-845B-4ED2A6D17DCE}"/>
-              </a:ext>
-            </a:extLst>
-          </p:cNvPr>
-          <p:cNvSpPr>
-            <a:spLocks noGrp="1"/>
-          </p:cNvSpPr>
-          <p:nvPr>
-            <p:ph type="title"/>
-          </p:nvPr>
-        </p:nvSpPr>
-        <p:spPr/>
-        <p:txBody>
-          <a:bodyPr/>
-          <a:lstStyle/>
-          <a:p>
-            <a:r>
-              <a:rPr lang="de-DE" dirty="0" err="1"/>
-              <a:t>bMSCs</a:t>
-            </a:r>
-            <a:r>
-              <a:rPr lang="de-DE" dirty="0"/>
-              <a:t> (4/7)</a:t>
-            </a:r>
-          </a:p>
-        </p:txBody>
-      </p:sp>
-      <p:sp>
-        <p:nvSpPr>
-          <p:cNvPr id="3" name="Inhaltsplatzhalter 2">
-            <a:extLst>
-              <a:ext uri="{FF2B5EF4-FFF2-40B4-BE49-F238E27FC236}">
-                <a16:creationId xmlns:a16="http://schemas.microsoft.com/office/drawing/2014/main" id="{78842A80-7C63-4FB3-8C0D-D0B2AFD44518}"/>
-              </a:ext>
-            </a:extLst>
-          </p:cNvPr>
-          <p:cNvSpPr>
-            <a:spLocks noGrp="1"/>
-          </p:cNvSpPr>
-          <p:nvPr>
-            <p:ph idx="1"/>
-          </p:nvPr>
-        </p:nvSpPr>
-        <p:spPr/>
-        <p:txBody>
-          <a:bodyPr/>
-          <a:lstStyle/>
-          <a:p>
-            <a:pPr marL="0" indent="0">
-              <a:buNone/>
-            </a:pPr>
-            <a:r>
-              <a:rPr lang="de-DE" dirty="0"/>
-              <a:t>Edit </a:t>
-            </a:r>
-            <a:r>
-              <a:rPr lang="de-DE" dirty="0" err="1"/>
-              <a:t>Termtable</a:t>
-            </a:r>
-            <a:endParaRPr lang="de-DE" dirty="0"/>
-          </a:p>
-        </p:txBody>
-      </p:sp>
-      <p:sp>
-        <p:nvSpPr>
-          <p:cNvPr id="4" name="Foliennummernplatzhalter 3">
-            <a:extLst>
-              <a:ext uri="{FF2B5EF4-FFF2-40B4-BE49-F238E27FC236}">
-                <a16:creationId xmlns:a16="http://schemas.microsoft.com/office/drawing/2014/main" id="{8DE23200-B097-4035-A199-95AD4279C717}"/>
-              </a:ext>
-            </a:extLst>
-          </p:cNvPr>
-          <p:cNvSpPr>
-            <a:spLocks noGrp="1"/>
-          </p:cNvSpPr>
-          <p:nvPr>
-            <p:ph type="sldNum" sz="quarter" idx="12"/>
-          </p:nvPr>
-        </p:nvSpPr>
-        <p:spPr/>
-        <p:txBody>
-          <a:bodyPr/>
-          <a:lstStyle/>
-          <a:p>
-            <a:fld id="{0E805572-8E5C-4FE5-A106-39EEE8227A5E}" type="slidenum">
-              <a:rPr lang="de-DE" smtClean="0"/>
-              <a:t>12</a:t>
-            </a:fld>
-            <a:endParaRPr lang="de-DE"/>
-          </a:p>
-        </p:txBody>
-      </p:sp>
-      <p:sp>
-        <p:nvSpPr>
-          <p:cNvPr id="7" name="Fußzeilenplatzhalter 6">
-            <a:extLst>
-              <a:ext uri="{FF2B5EF4-FFF2-40B4-BE49-F238E27FC236}">
-                <a16:creationId xmlns:a16="http://schemas.microsoft.com/office/drawing/2014/main" id="{DD4C51CF-18A4-4A2A-A336-45BB768664C7}"/>
-              </a:ext>
-            </a:extLst>
-          </p:cNvPr>
-          <p:cNvSpPr>
-            <a:spLocks noGrp="1"/>
-          </p:cNvSpPr>
-          <p:nvPr>
-            <p:ph type="ftr" sz="quarter" idx="11"/>
-          </p:nvPr>
-        </p:nvSpPr>
-        <p:spPr>
-          <a:xfrm>
-            <a:off x="838200" y="6356349"/>
-            <a:ext cx="4114800" cy="365125"/>
-          </a:xfrm>
-        </p:spPr>
-        <p:txBody>
-          <a:bodyPr/>
-          <a:lstStyle/>
-          <a:p>
-            <a:pPr algn="l"/>
-            <a:r>
-              <a:rPr lang="de-DE" dirty="0"/>
-              <a:t>Dave </a:t>
-            </a:r>
-            <a:r>
-              <a:rPr lang="de-DE" dirty="0" err="1"/>
-              <a:t>Makila</a:t>
-            </a:r>
-            <a:r>
-              <a:rPr lang="de-DE" dirty="0"/>
-              <a:t> </a:t>
-            </a:r>
-          </a:p>
-        </p:txBody>
-      </p:sp>
-      <p:pic>
-        <p:nvPicPr>
-          <p:cNvPr id="8" name="Grafik 7">
-            <a:extLst>
-              <a:ext uri="{FF2B5EF4-FFF2-40B4-BE49-F238E27FC236}">
-                <a16:creationId xmlns:a16="http://schemas.microsoft.com/office/drawing/2014/main" id="{65580376-72A1-4E54-8530-8BEEFE029E8D}"/>
-              </a:ext>
-            </a:extLst>
-          </p:cNvPr>
-          <p:cNvPicPr>
-            <a:picLocks noChangeAspect="1"/>
-          </p:cNvPicPr>
-          <p:nvPr/>
-        </p:nvPicPr>
-        <p:blipFill>
-          <a:blip r:embed="rId2">
-            <a:extLst>
-              <a:ext uri="{28A0092B-C50C-407E-A947-70E740481C1C}">
-                <a14:useLocalDpi xmlns:a14="http://schemas.microsoft.com/office/drawing/2010/main" val="0"/>
-              </a:ext>
-            </a:extLst>
-          </a:blip>
-          <a:stretch>
-            <a:fillRect/>
-          </a:stretch>
-        </p:blipFill>
-        <p:spPr>
-          <a:xfrm>
-            <a:off x="4229100" y="1212128"/>
-            <a:ext cx="7124700" cy="4581525"/>
-          </a:xfrm>
-          <a:prstGeom prst="rect">
-            <a:avLst/>
-          </a:prstGeom>
-        </p:spPr>
-      </p:pic>
-    </p:spTree>
-    <p:extLst>
-      <p:ext uri="{BB962C8B-B14F-4D97-AF65-F5344CB8AC3E}">
-        <p14:creationId xmlns:p14="http://schemas.microsoft.com/office/powerpoint/2010/main" val="3058222833"/>
-      </p:ext>
-    </p:extLst>
-  </p:cSld>
-  <p:clrMapOvr>
-    <a:masterClrMapping/>
-  </p:clrMapOvr>
-</p:sld>
-</file>
-
 <file path=ppt/slides/slide13.xml><?xml version="1.0" encoding="utf-8"?>
 <p:sld xmlns:a="http://schemas.openxmlformats.org/drawingml/2006/main" xmlns:r="http://schemas.openxmlformats.org/officeDocument/2006/relationships" xmlns:p="http://schemas.openxmlformats.org/presentationml/2006/main">
   <p:cSld>
@@ -4448,7 +4451,7 @@
             </a:r>
             <a:r>
               <a:rPr lang="de-DE" dirty="0"/>
-              <a:t> (5/7)</a:t>
+              <a:t> (4/7)</a:t>
             </a:r>
           </a:p>
         </p:txBody>
@@ -4683,7 +4686,7 @@
             </a:r>
             <a:r>
               <a:rPr lang="de-DE" dirty="0"/>
-              <a:t> (6/7)</a:t>
+              <a:t> (5/7)</a:t>
             </a:r>
           </a:p>
         </p:txBody>
@@ -4713,10 +4716,9 @@
               <a:buNone/>
             </a:pPr>
             <a:r>
-              <a:rPr lang="de-DE" dirty="0" err="1"/>
-              <a:t>LogIn</a:t>
-            </a:r>
-            <a:endParaRPr lang="de-DE" dirty="0"/>
+              <a:rPr lang="de-DE" dirty="0"/>
+              <a:t>Wochenplan erstellen</a:t>
+            </a:r>
           </a:p>
         </p:txBody>
       </p:sp>
@@ -4767,7 +4769,7 @@
         </p:nvSpPr>
         <p:spPr>
           <a:xfrm>
-            <a:off x="838200" y="6356349"/>
+            <a:off x="838200" y="6492875"/>
             <a:ext cx="4114800" cy="365125"/>
           </a:xfrm>
         </p:spPr>
@@ -4778,17 +4780,32 @@
             <a:pPr algn="l"/>
             <a:r>
               <a:rPr lang="de-DE" dirty="0"/>
-              <a:t>Merlin von Rössing</a:t>
+              <a:t>Alisan </a:t>
+            </a:r>
+            <a:r>
+              <a:rPr lang="de-DE" dirty="0" err="1"/>
+              <a:t>Gündogan</a:t>
+            </a:r>
+            <a:r>
+              <a:rPr lang="de-DE" dirty="0"/>
+              <a:t> </a:t>
+            </a:r>
+          </a:p>
+          <a:p>
+            <a:pPr algn="l"/>
+            <a:r>
+              <a:rPr lang="de-DE" dirty="0"/>
+              <a:t> </a:t>
             </a:r>
           </a:p>
         </p:txBody>
       </p:sp>
       <p:pic>
         <p:nvPicPr>
-          <p:cNvPr id="12" name="Grafik 11">
-            <a:extLst>
-              <a:ext uri="{FF2B5EF4-FFF2-40B4-BE49-F238E27FC236}">
-                <a16:creationId xmlns:a16="http://schemas.microsoft.com/office/drawing/2014/main" id="{A66DE179-9E3C-4639-A0AF-79B51F47EF17}"/>
+          <p:cNvPr id="6" name="Grafik 5">
+            <a:extLst>
+              <a:ext uri="{FF2B5EF4-FFF2-40B4-BE49-F238E27FC236}">
+                <a16:creationId xmlns:a16="http://schemas.microsoft.com/office/drawing/2014/main" id="{80D514B9-377D-4D38-B7D1-E7B9247F241E}"/>
               </a:ext>
             </a:extLst>
           </p:cNvPr>
@@ -4811,8 +4828,8 @@
         </p:blipFill>
         <p:spPr>
           <a:xfrm>
-            <a:off x="4732125" y="0"/>
-            <a:ext cx="5013754" cy="6858000"/>
+            <a:off x="7515998" y="365125"/>
+            <a:ext cx="3837802" cy="5542822"/>
           </a:xfrm>
           <a:prstGeom prst="rect">
             <a:avLst/>
@@ -4822,7 +4839,7 @@
     </p:spTree>
     <p:extLst>
       <p:ext uri="{BB962C8B-B14F-4D97-AF65-F5344CB8AC3E}">
-        <p14:creationId xmlns:p14="http://schemas.microsoft.com/office/powerpoint/2010/main" val="1489229010"/>
+        <p14:creationId xmlns:p14="http://schemas.microsoft.com/office/powerpoint/2010/main" val="1634783217"/>
       </p:ext>
     </p:extLst>
   </p:cSld>
@@ -4876,7 +4893,7 @@
             </a:r>
             <a:r>
               <a:rPr lang="de-DE" dirty="0"/>
-              <a:t> (7/7)</a:t>
+              <a:t> (6/7)</a:t>
             </a:r>
           </a:p>
         </p:txBody>
@@ -4897,7 +4914,12 @@
             <p:ph idx="1"/>
           </p:nvPr>
         </p:nvSpPr>
-        <p:spPr/>
+        <p:spPr>
+          <a:xfrm>
+            <a:off x="628475" y="1825625"/>
+            <a:ext cx="10515600" cy="4351338"/>
+          </a:xfrm>
+        </p:spPr>
         <p:txBody>
           <a:bodyPr/>
           <a:lstStyle/>
@@ -4906,12 +4928,8 @@
               <a:buNone/>
             </a:pPr>
             <a:r>
-              <a:rPr lang="de-DE" dirty="0" err="1"/>
-              <a:t>Timetable</a:t>
-            </a:r>
-            <a:r>
               <a:rPr lang="de-DE" dirty="0"/>
-              <a:t> erstellen</a:t>
+              <a:t>Semesterplan editieren</a:t>
             </a:r>
           </a:p>
         </p:txBody>
@@ -4974,32 +4992,25 @@
             <a:pPr algn="l"/>
             <a:r>
               <a:rPr lang="de-DE" dirty="0"/>
-              <a:t>Alisan </a:t>
+              <a:t>Dave </a:t>
             </a:r>
             <a:r>
               <a:rPr lang="de-DE" dirty="0" err="1"/>
-              <a:t>Gündogan</a:t>
+              <a:t>Makila</a:t>
             </a:r>
             <a:r>
               <a:rPr lang="de-DE" dirty="0"/>
               <a:t> </a:t>
             </a:r>
           </a:p>
-          <a:p>
-            <a:pPr algn="l"/>
-            <a:r>
-              <a:rPr lang="de-DE" dirty="0"/>
-              <a:t> </a:t>
-            </a:r>
-          </a:p>
         </p:txBody>
       </p:sp>
       <p:pic>
         <p:nvPicPr>
-          <p:cNvPr id="6" name="Grafik 5">
-            <a:extLst>
-              <a:ext uri="{FF2B5EF4-FFF2-40B4-BE49-F238E27FC236}">
-                <a16:creationId xmlns:a16="http://schemas.microsoft.com/office/drawing/2014/main" id="{80D514B9-377D-4D38-B7D1-E7B9247F241E}"/>
+          <p:cNvPr id="8" name="Grafik 7">
+            <a:extLst>
+              <a:ext uri="{FF2B5EF4-FFF2-40B4-BE49-F238E27FC236}">
+                <a16:creationId xmlns:a16="http://schemas.microsoft.com/office/drawing/2014/main" id="{65580376-72A1-4E54-8530-8BEEFE029E8D}"/>
               </a:ext>
             </a:extLst>
           </p:cNvPr>
@@ -5022,8 +5033,8 @@
         </p:blipFill>
         <p:spPr>
           <a:xfrm>
-            <a:off x="6059970" y="136524"/>
-            <a:ext cx="4653891" cy="6721475"/>
+            <a:off x="4229100" y="1212128"/>
+            <a:ext cx="7124700" cy="4581525"/>
           </a:xfrm>
           <a:prstGeom prst="rect">
             <a:avLst/>
@@ -5033,7 +5044,7 @@
     </p:spTree>
     <p:extLst>
       <p:ext uri="{BB962C8B-B14F-4D97-AF65-F5344CB8AC3E}">
-        <p14:creationId xmlns:p14="http://schemas.microsoft.com/office/powerpoint/2010/main" val="1634783217"/>
+        <p14:creationId xmlns:p14="http://schemas.microsoft.com/office/powerpoint/2010/main" val="3058222833"/>
       </p:ext>
     </p:extLst>
   </p:cSld>
@@ -5065,7 +5076,7 @@
           <p:cNvPr id="2" name="Titel 1">
             <a:extLst>
               <a:ext uri="{FF2B5EF4-FFF2-40B4-BE49-F238E27FC236}">
-                <a16:creationId xmlns:a16="http://schemas.microsoft.com/office/drawing/2014/main" id="{A5DCDCB1-6F66-4E70-AA84-6AC4150AC41C}"/>
+                <a16:creationId xmlns:a16="http://schemas.microsoft.com/office/drawing/2014/main" id="{190DC1C8-46B2-4CBC-845B-4ED2A6D17DCE}"/>
               </a:ext>
             </a:extLst>
           </p:cNvPr>
@@ -5083,9 +5094,43 @@
           <a:p>
             <a:r>
               <a:rPr lang="de-DE" dirty="0" err="1"/>
-              <a:t>hMSC</a:t>
-            </a:r>
-            <a:endParaRPr lang="de-DE" dirty="0"/>
+              <a:t>bMSCs</a:t>
+            </a:r>
+            <a:r>
+              <a:rPr lang="de-DE" dirty="0"/>
+              <a:t> (7/7)</a:t>
+            </a:r>
+          </a:p>
+        </p:txBody>
+      </p:sp>
+      <p:sp>
+        <p:nvSpPr>
+          <p:cNvPr id="3" name="Inhaltsplatzhalter 2">
+            <a:extLst>
+              <a:ext uri="{FF2B5EF4-FFF2-40B4-BE49-F238E27FC236}">
+                <a16:creationId xmlns:a16="http://schemas.microsoft.com/office/drawing/2014/main" id="{78842A80-7C63-4FB3-8C0D-D0B2AFD44518}"/>
+              </a:ext>
+            </a:extLst>
+          </p:cNvPr>
+          <p:cNvSpPr>
+            <a:spLocks noGrp="1"/>
+          </p:cNvSpPr>
+          <p:nvPr>
+            <p:ph idx="1"/>
+          </p:nvPr>
+        </p:nvSpPr>
+        <p:spPr/>
+        <p:txBody>
+          <a:bodyPr/>
+          <a:lstStyle/>
+          <a:p>
+            <a:pPr marL="0" indent="0">
+              <a:buNone/>
+            </a:pPr>
+            <a:r>
+              <a:rPr lang="de-DE" dirty="0"/>
+              <a:t>Anwesenheitsplan</a:t>
+            </a:r>
           </a:p>
         </p:txBody>
       </p:sp>
@@ -5094,7 +5139,7 @@
           <p:cNvPr id="4" name="Foliennummernplatzhalter 3">
             <a:extLst>
               <a:ext uri="{FF2B5EF4-FFF2-40B4-BE49-F238E27FC236}">
-                <a16:creationId xmlns:a16="http://schemas.microsoft.com/office/drawing/2014/main" id="{12B98F94-C8BC-4971-A003-B025AD3C127D}"/>
+                <a16:creationId xmlns:a16="http://schemas.microsoft.com/office/drawing/2014/main" id="{8DE23200-B097-4035-A199-95AD4279C717}"/>
               </a:ext>
             </a:extLst>
           </p:cNvPr>
@@ -5113,6 +5158,167 @@
             <a:fld id="{0E805572-8E5C-4FE5-A106-39EEE8227A5E}" type="slidenum">
               <a:rPr lang="de-DE" smtClean="0"/>
               <a:t>16</a:t>
+            </a:fld>
+            <a:endParaRPr lang="de-DE"/>
+          </a:p>
+        </p:txBody>
+      </p:sp>
+      <p:sp>
+        <p:nvSpPr>
+          <p:cNvPr id="7" name="Fußzeilenplatzhalter 6">
+            <a:extLst>
+              <a:ext uri="{FF2B5EF4-FFF2-40B4-BE49-F238E27FC236}">
+                <a16:creationId xmlns:a16="http://schemas.microsoft.com/office/drawing/2014/main" id="{DD4C51CF-18A4-4A2A-A336-45BB768664C7}"/>
+              </a:ext>
+            </a:extLst>
+          </p:cNvPr>
+          <p:cNvSpPr>
+            <a:spLocks noGrp="1"/>
+          </p:cNvSpPr>
+          <p:nvPr>
+            <p:ph type="ftr" sz="quarter" idx="11"/>
+          </p:nvPr>
+        </p:nvSpPr>
+        <p:spPr>
+          <a:xfrm>
+            <a:off x="838200" y="6356349"/>
+            <a:ext cx="4114800" cy="365125"/>
+          </a:xfrm>
+        </p:spPr>
+        <p:txBody>
+          <a:bodyPr/>
+          <a:lstStyle/>
+          <a:p>
+            <a:pPr algn="l"/>
+            <a:r>
+              <a:rPr lang="de-DE" dirty="0"/>
+              <a:t>Merlin von Rössing</a:t>
+            </a:r>
+          </a:p>
+        </p:txBody>
+      </p:sp>
+      <p:pic>
+        <p:nvPicPr>
+          <p:cNvPr id="8" name="Grafik 7">
+            <a:extLst>
+              <a:ext uri="{FF2B5EF4-FFF2-40B4-BE49-F238E27FC236}">
+                <a16:creationId xmlns:a16="http://schemas.microsoft.com/office/drawing/2014/main" id="{2C1865DC-6FE4-405A-AF56-406BE798E1F9}"/>
+              </a:ext>
+            </a:extLst>
+          </p:cNvPr>
+          <p:cNvPicPr/>
+          <p:nvPr/>
+        </p:nvPicPr>
+        <p:blipFill>
+          <a:blip r:embed="rId2">
+            <a:extLst>
+              <a:ext uri="{28A0092B-C50C-407E-A947-70E740481C1C}">
+                <a14:useLocalDpi xmlns:a14="http://schemas.microsoft.com/office/drawing/2010/main" val="0"/>
+              </a:ext>
+            </a:extLst>
+          </a:blip>
+          <a:srcRect/>
+          <a:stretch>
+            <a:fillRect/>
+          </a:stretch>
+        </p:blipFill>
+        <p:spPr bwMode="auto">
+          <a:xfrm>
+            <a:off x="4781550" y="1226185"/>
+            <a:ext cx="5759450" cy="4405630"/>
+          </a:xfrm>
+          <a:prstGeom prst="rect">
+            <a:avLst/>
+          </a:prstGeom>
+          <a:noFill/>
+          <a:ln>
+            <a:noFill/>
+          </a:ln>
+        </p:spPr>
+      </p:pic>
+    </p:spTree>
+    <p:extLst>
+      <p:ext uri="{BB962C8B-B14F-4D97-AF65-F5344CB8AC3E}">
+        <p14:creationId xmlns:p14="http://schemas.microsoft.com/office/powerpoint/2010/main" val="1489229010"/>
+      </p:ext>
+    </p:extLst>
+  </p:cSld>
+  <p:clrMapOvr>
+    <a:masterClrMapping/>
+  </p:clrMapOvr>
+</p:sld>
+</file>
+
+<file path=ppt/slides/slide17.xml><?xml version="1.0" encoding="utf-8"?>
+<p:sld xmlns:a="http://schemas.openxmlformats.org/drawingml/2006/main" xmlns:r="http://schemas.openxmlformats.org/officeDocument/2006/relationships" xmlns:p="http://schemas.openxmlformats.org/presentationml/2006/main">
+  <p:cSld>
+    <p:spTree>
+      <p:nvGrpSpPr>
+        <p:cNvPr id="1" name=""/>
+        <p:cNvGrpSpPr/>
+        <p:nvPr/>
+      </p:nvGrpSpPr>
+      <p:grpSpPr>
+        <a:xfrm>
+          <a:off x="0" y="0"/>
+          <a:ext cx="0" cy="0"/>
+          <a:chOff x="0" y="0"/>
+          <a:chExt cx="0" cy="0"/>
+        </a:xfrm>
+      </p:grpSpPr>
+      <p:sp>
+        <p:nvSpPr>
+          <p:cNvPr id="2" name="Titel 1">
+            <a:extLst>
+              <a:ext uri="{FF2B5EF4-FFF2-40B4-BE49-F238E27FC236}">
+                <a16:creationId xmlns:a16="http://schemas.microsoft.com/office/drawing/2014/main" id="{A5DCDCB1-6F66-4E70-AA84-6AC4150AC41C}"/>
+              </a:ext>
+            </a:extLst>
+          </p:cNvPr>
+          <p:cNvSpPr>
+            <a:spLocks noGrp="1"/>
+          </p:cNvSpPr>
+          <p:nvPr>
+            <p:ph type="title"/>
+          </p:nvPr>
+        </p:nvSpPr>
+        <p:spPr/>
+        <p:txBody>
+          <a:bodyPr/>
+          <a:lstStyle/>
+          <a:p>
+            <a:r>
+              <a:rPr lang="de-DE" dirty="0" err="1"/>
+              <a:t>hMSC</a:t>
+            </a:r>
+            <a:endParaRPr lang="de-DE" dirty="0"/>
+          </a:p>
+        </p:txBody>
+      </p:sp>
+      <p:sp>
+        <p:nvSpPr>
+          <p:cNvPr id="4" name="Foliennummernplatzhalter 3">
+            <a:extLst>
+              <a:ext uri="{FF2B5EF4-FFF2-40B4-BE49-F238E27FC236}">
+                <a16:creationId xmlns:a16="http://schemas.microsoft.com/office/drawing/2014/main" id="{12B98F94-C8BC-4971-A003-B025AD3C127D}"/>
+              </a:ext>
+            </a:extLst>
+          </p:cNvPr>
+          <p:cNvSpPr>
+            <a:spLocks noGrp="1"/>
+          </p:cNvSpPr>
+          <p:nvPr>
+            <p:ph type="sldNum" sz="quarter" idx="12"/>
+          </p:nvPr>
+        </p:nvSpPr>
+        <p:spPr/>
+        <p:txBody>
+          <a:bodyPr/>
+          <a:lstStyle/>
+          <a:p>
+            <a:fld id="{0E805572-8E5C-4FE5-A106-39EEE8227A5E}" type="slidenum">
+              <a:rPr lang="de-DE" smtClean="0"/>
+              <a:t>17</a:t>
             </a:fld>
             <a:endParaRPr lang="de-DE"/>
           </a:p>
@@ -5407,7 +5613,7 @@
         </p:nvSpPr>
         <p:spPr>
           <a:xfrm>
-            <a:off x="838200" y="365125"/>
+            <a:off x="838200" y="320675"/>
             <a:ext cx="10515600" cy="1325563"/>
           </a:xfrm>
         </p:spPr>
@@ -5417,7 +5623,7 @@
           <a:p>
             <a:r>
               <a:rPr lang="de-DE" dirty="0"/>
-              <a:t>User Stories(1/6)</a:t>
+              <a:t>User Stories(1/7)</a:t>
             </a:r>
           </a:p>
         </p:txBody>
@@ -5530,10 +5736,10 @@
       </p:sp>
       <p:pic>
         <p:nvPicPr>
-          <p:cNvPr id="9" name="Grafik 8">
-            <a:extLst>
-              <a:ext uri="{FF2B5EF4-FFF2-40B4-BE49-F238E27FC236}">
-                <a16:creationId xmlns:a16="http://schemas.microsoft.com/office/drawing/2014/main" id="{C3F55F38-75BE-4BFE-ADF3-81962D985E49}"/>
+          <p:cNvPr id="5" name="Grafik 4">
+            <a:extLst>
+              <a:ext uri="{FF2B5EF4-FFF2-40B4-BE49-F238E27FC236}">
+                <a16:creationId xmlns:a16="http://schemas.microsoft.com/office/drawing/2014/main" id="{1F6CEF74-53C1-480E-A847-D0525971DD24}"/>
               </a:ext>
             </a:extLst>
           </p:cNvPr>
@@ -5550,8 +5756,8 @@
         </p:blipFill>
         <p:spPr>
           <a:xfrm>
-            <a:off x="1685925" y="2624931"/>
-            <a:ext cx="8820150" cy="2752725"/>
+            <a:off x="2619375" y="2910681"/>
+            <a:ext cx="6953250" cy="2181225"/>
           </a:xfrm>
           <a:prstGeom prst="rect">
             <a:avLst/>
@@ -5606,7 +5812,7 @@
         </p:nvSpPr>
         <p:spPr>
           <a:xfrm>
-            <a:off x="511029" y="270618"/>
+            <a:off x="838200" y="320675"/>
             <a:ext cx="10515600" cy="1325563"/>
           </a:xfrm>
         </p:spPr>
@@ -5616,7 +5822,7 @@
           <a:p>
             <a:r>
               <a:rPr lang="de-DE" dirty="0"/>
-              <a:t>User Stories(2/6)</a:t>
+              <a:t>User Stories(2/7)</a:t>
             </a:r>
           </a:p>
         </p:txBody>
@@ -5728,10 +5934,10 @@
       </p:sp>
       <p:pic>
         <p:nvPicPr>
-          <p:cNvPr id="9" name="Grafik 8">
-            <a:extLst>
-              <a:ext uri="{FF2B5EF4-FFF2-40B4-BE49-F238E27FC236}">
-                <a16:creationId xmlns:a16="http://schemas.microsoft.com/office/drawing/2014/main" id="{74D6DAC3-FF3C-49CB-9138-7A29AF238FCB}"/>
+          <p:cNvPr id="5" name="Grafik 4">
+            <a:extLst>
+              <a:ext uri="{FF2B5EF4-FFF2-40B4-BE49-F238E27FC236}">
+                <a16:creationId xmlns:a16="http://schemas.microsoft.com/office/drawing/2014/main" id="{534D768C-6BDD-482E-B2FE-A434E3913B93}"/>
               </a:ext>
             </a:extLst>
           </p:cNvPr>
@@ -5748,8 +5954,8 @@
         </p:blipFill>
         <p:spPr>
           <a:xfrm>
-            <a:off x="1676400" y="2558256"/>
-            <a:ext cx="8839200" cy="2886075"/>
+            <a:off x="2586037" y="2901156"/>
+            <a:ext cx="7019925" cy="2200275"/>
           </a:xfrm>
           <a:prstGeom prst="rect">
             <a:avLst/>
@@ -5802,14 +6008,19 @@
             <p:ph type="title"/>
           </p:nvPr>
         </p:nvSpPr>
-        <p:spPr/>
+        <p:spPr>
+          <a:xfrm>
+            <a:off x="838200" y="309164"/>
+            <a:ext cx="10515600" cy="1325563"/>
+          </a:xfrm>
+        </p:spPr>
         <p:txBody>
           <a:bodyPr/>
           <a:lstStyle/>
           <a:p>
             <a:r>
               <a:rPr lang="de-DE" dirty="0"/>
-              <a:t>User Stories(3/6)</a:t>
+              <a:t>User Stories(3/7)</a:t>
             </a:r>
           </a:p>
         </p:txBody>
@@ -5921,10 +6132,10 @@
       </p:sp>
       <p:pic>
         <p:nvPicPr>
-          <p:cNvPr id="5" name="Grafik 4">
-            <a:extLst>
-              <a:ext uri="{FF2B5EF4-FFF2-40B4-BE49-F238E27FC236}">
-                <a16:creationId xmlns:a16="http://schemas.microsoft.com/office/drawing/2014/main" id="{E895FB29-ECE5-40C0-84A0-D8A84BCFF372}"/>
+          <p:cNvPr id="6" name="Grafik 5">
+            <a:extLst>
+              <a:ext uri="{FF2B5EF4-FFF2-40B4-BE49-F238E27FC236}">
+                <a16:creationId xmlns:a16="http://schemas.microsoft.com/office/drawing/2014/main" id="{3696AED3-94DB-4D23-AADA-990B2E6DB4C9}"/>
               </a:ext>
             </a:extLst>
           </p:cNvPr>
@@ -5941,8 +6152,8 @@
         </p:blipFill>
         <p:spPr>
           <a:xfrm>
-            <a:off x="1733550" y="2428080"/>
-            <a:ext cx="8724900" cy="3190875"/>
+            <a:off x="2619375" y="2747168"/>
+            <a:ext cx="6953250" cy="2552700"/>
           </a:xfrm>
           <a:prstGeom prst="rect">
             <a:avLst/>
@@ -5995,14 +6206,19 @@
             <p:ph type="title"/>
           </p:nvPr>
         </p:nvSpPr>
-        <p:spPr/>
+        <p:spPr>
+          <a:xfrm>
+            <a:off x="838200" y="320675"/>
+            <a:ext cx="10515600" cy="1325563"/>
+          </a:xfrm>
+        </p:spPr>
         <p:txBody>
           <a:bodyPr/>
           <a:lstStyle/>
           <a:p>
             <a:r>
               <a:rPr lang="de-DE" dirty="0"/>
-              <a:t>User Stories(4/6)</a:t>
+              <a:t>User Stories(4/7)</a:t>
             </a:r>
           </a:p>
         </p:txBody>
@@ -6109,10 +6325,10 @@
       </p:sp>
       <p:pic>
         <p:nvPicPr>
-          <p:cNvPr id="7" name="Grafik 6">
-            <a:extLst>
-              <a:ext uri="{FF2B5EF4-FFF2-40B4-BE49-F238E27FC236}">
-                <a16:creationId xmlns:a16="http://schemas.microsoft.com/office/drawing/2014/main" id="{304ADF41-4588-41FA-A733-D1C72B1F199D}"/>
+          <p:cNvPr id="5" name="Grafik 4">
+            <a:extLst>
+              <a:ext uri="{FF2B5EF4-FFF2-40B4-BE49-F238E27FC236}">
+                <a16:creationId xmlns:a16="http://schemas.microsoft.com/office/drawing/2014/main" id="{169AD7B8-ABD2-4166-9D9E-1E869040A9AC}"/>
               </a:ext>
             </a:extLst>
           </p:cNvPr>
@@ -6129,8 +6345,8 @@
         </p:blipFill>
         <p:spPr>
           <a:xfrm>
-            <a:off x="1619250" y="2563019"/>
-            <a:ext cx="8953500" cy="2876550"/>
+            <a:off x="2633662" y="2939256"/>
+            <a:ext cx="6924675" cy="2124075"/>
           </a:xfrm>
           <a:prstGeom prst="rect">
             <a:avLst/>
@@ -6183,14 +6399,19 @@
             <p:ph type="title"/>
           </p:nvPr>
         </p:nvSpPr>
-        <p:spPr/>
+        <p:spPr>
+          <a:xfrm>
+            <a:off x="838200" y="320675"/>
+            <a:ext cx="10515600" cy="1325563"/>
+          </a:xfrm>
+        </p:spPr>
         <p:txBody>
           <a:bodyPr/>
           <a:lstStyle/>
           <a:p>
             <a:r>
               <a:rPr lang="de-DE" dirty="0"/>
-              <a:t>User Stories(5/6)</a:t>
+              <a:t>User Stories(5/7)</a:t>
             </a:r>
           </a:p>
         </p:txBody>
@@ -6305,10 +6526,10 @@
       </p:sp>
       <p:pic>
         <p:nvPicPr>
-          <p:cNvPr id="5" name="Grafik 4">
-            <a:extLst>
-              <a:ext uri="{FF2B5EF4-FFF2-40B4-BE49-F238E27FC236}">
-                <a16:creationId xmlns:a16="http://schemas.microsoft.com/office/drawing/2014/main" id="{23B3CACB-0FF2-4A60-808F-DC7DC5E8D8B9}"/>
+          <p:cNvPr id="7" name="Grafik 6">
+            <a:extLst>
+              <a:ext uri="{FF2B5EF4-FFF2-40B4-BE49-F238E27FC236}">
+                <a16:creationId xmlns:a16="http://schemas.microsoft.com/office/drawing/2014/main" id="{5FB58CC5-9443-4A0D-8EC9-0A2272979980}"/>
               </a:ext>
             </a:extLst>
           </p:cNvPr>
@@ -6325,8 +6546,8 @@
         </p:blipFill>
         <p:spPr>
           <a:xfrm>
-            <a:off x="1643062" y="2563019"/>
-            <a:ext cx="8905875" cy="2876550"/>
+            <a:off x="2647950" y="2939256"/>
+            <a:ext cx="6896100" cy="2124075"/>
           </a:xfrm>
           <a:prstGeom prst="rect">
             <a:avLst/>
@@ -6379,14 +6600,19 @@
             <p:ph type="title"/>
           </p:nvPr>
         </p:nvSpPr>
-        <p:spPr/>
+        <p:spPr>
+          <a:xfrm>
+            <a:off x="838200" y="320675"/>
+            <a:ext cx="10515600" cy="1325563"/>
+          </a:xfrm>
+        </p:spPr>
         <p:txBody>
           <a:bodyPr/>
           <a:lstStyle/>
           <a:p>
             <a:r>
               <a:rPr lang="de-DE" dirty="0"/>
-              <a:t>User Stories(6/6)</a:t>
+              <a:t>User Stories(6/7)</a:t>
             </a:r>
           </a:p>
         </p:txBody>
@@ -6498,10 +6724,10 @@
       </p:sp>
       <p:pic>
         <p:nvPicPr>
-          <p:cNvPr id="8" name="Grafik 7">
-            <a:extLst>
-              <a:ext uri="{FF2B5EF4-FFF2-40B4-BE49-F238E27FC236}">
-                <a16:creationId xmlns:a16="http://schemas.microsoft.com/office/drawing/2014/main" id="{B64A1B7A-E8F7-4255-8B7D-8482341AD531}"/>
+          <p:cNvPr id="5" name="Grafik 4">
+            <a:extLst>
+              <a:ext uri="{FF2B5EF4-FFF2-40B4-BE49-F238E27FC236}">
+                <a16:creationId xmlns:a16="http://schemas.microsoft.com/office/drawing/2014/main" id="{1B3107C0-C873-41A3-A552-5CAE57A6912F}"/>
               </a:ext>
             </a:extLst>
           </p:cNvPr>
@@ -6518,8 +6744,8 @@
         </p:blipFill>
         <p:spPr>
           <a:xfrm>
-            <a:off x="1695450" y="2596356"/>
-            <a:ext cx="8801100" cy="2809875"/>
+            <a:off x="2647950" y="2939256"/>
+            <a:ext cx="6896100" cy="2124075"/>
           </a:xfrm>
           <a:prstGeom prst="rect">
             <a:avLst/>
@@ -6574,7 +6800,7 @@
         </p:nvSpPr>
         <p:spPr>
           <a:xfrm>
-            <a:off x="838200" y="365125"/>
+            <a:off x="838200" y="320675"/>
             <a:ext cx="10515600" cy="1325563"/>
           </a:xfrm>
         </p:spPr>
@@ -6583,12 +6809,8 @@
           <a:lstStyle/>
           <a:p>
             <a:r>
-              <a:rPr lang="de-DE" dirty="0" err="1"/>
-              <a:t>bMSCs</a:t>
-            </a:r>
-            <a:r>
               <a:rPr lang="de-DE" dirty="0"/>
-              <a:t> (1/7)</a:t>
+              <a:t>User Stories(7/7)</a:t>
             </a:r>
           </a:p>
         </p:txBody>
@@ -6609,12 +6831,7 @@
             <p:ph idx="1"/>
           </p:nvPr>
         </p:nvSpPr>
-        <p:spPr>
-          <a:xfrm>
-            <a:off x="838200" y="1825625"/>
-            <a:ext cx="10515600" cy="4351338"/>
-          </a:xfrm>
-        </p:spPr>
+        <p:spPr/>
         <p:txBody>
           <a:bodyPr/>
           <a:lstStyle/>
@@ -6624,8 +6841,14 @@
             </a:pPr>
             <a:r>
               <a:rPr lang="de-DE" dirty="0"/>
-              <a:t>Registrieren</a:t>
-            </a:r>
+              <a:t>Anwesenheitsplan erstellen</a:t>
+            </a:r>
+          </a:p>
+          <a:p>
+            <a:pPr marL="0" indent="0">
+              <a:buNone/>
+            </a:pPr>
+            <a:endParaRPr lang="de-DE" dirty="0"/>
           </a:p>
         </p:txBody>
       </p:sp>
@@ -6634,7 +6857,7 @@
           <p:cNvPr id="4" name="Foliennummernplatzhalter 3">
             <a:extLst>
               <a:ext uri="{FF2B5EF4-FFF2-40B4-BE49-F238E27FC236}">
-                <a16:creationId xmlns:a16="http://schemas.microsoft.com/office/drawing/2014/main" id="{34FA1B3A-EF20-4949-AFED-A74DC82A279F}"/>
+                <a16:creationId xmlns:a16="http://schemas.microsoft.com/office/drawing/2014/main" id="{8DE23200-B097-4035-A199-95AD4279C717}"/>
               </a:ext>
             </a:extLst>
           </p:cNvPr>
@@ -6645,12 +6868,7 @@
             <p:ph type="sldNum" sz="quarter" idx="12"/>
           </p:nvPr>
         </p:nvSpPr>
-        <p:spPr>
-          <a:xfrm>
-            <a:off x="8610600" y="6356350"/>
-            <a:ext cx="2743200" cy="365125"/>
-          </a:xfrm>
-        </p:spPr>
+        <p:spPr/>
         <p:txBody>
           <a:bodyPr/>
           <a:lstStyle/>
@@ -6665,10 +6883,10 @@
       </p:sp>
       <p:sp>
         <p:nvSpPr>
-          <p:cNvPr id="9" name="Fußzeilenplatzhalter 6">
-            <a:extLst>
-              <a:ext uri="{FF2B5EF4-FFF2-40B4-BE49-F238E27FC236}">
-                <a16:creationId xmlns:a16="http://schemas.microsoft.com/office/drawing/2014/main" id="{DF560FDE-54AD-4544-8B62-83304D790545}"/>
+          <p:cNvPr id="6" name="Fußzeilenplatzhalter 6">
+            <a:extLst>
+              <a:ext uri="{FF2B5EF4-FFF2-40B4-BE49-F238E27FC236}">
+                <a16:creationId xmlns:a16="http://schemas.microsoft.com/office/drawing/2014/main" id="{46BDD938-039C-48E1-A01C-8496D259CFAD}"/>
               </a:ext>
             </a:extLst>
           </p:cNvPr>
@@ -6692,7 +6910,7 @@
             <a:pPr algn="l"/>
             <a:r>
               <a:rPr lang="de-DE" dirty="0"/>
-              <a:t>Tobias Sieber</a:t>
+              <a:t>Merlin von Rössing</a:t>
             </a:r>
           </a:p>
         </p:txBody>
@@ -6702,7 +6920,7 @@
           <p:cNvPr id="7" name="Grafik 6">
             <a:extLst>
               <a:ext uri="{FF2B5EF4-FFF2-40B4-BE49-F238E27FC236}">
-                <a16:creationId xmlns:a16="http://schemas.microsoft.com/office/drawing/2014/main" id="{FD44DF95-6A2A-49CA-BB30-55C6CAC08931}"/>
+                <a16:creationId xmlns:a16="http://schemas.microsoft.com/office/drawing/2014/main" id="{60863BFF-2354-4968-91A9-6FE571CF1230}"/>
               </a:ext>
             </a:extLst>
           </p:cNvPr>
@@ -6712,21 +6930,15 @@
           <p:nvPr/>
         </p:nvPicPr>
         <p:blipFill>
-          <a:blip r:embed="rId2">
-            <a:extLst>
-              <a:ext uri="{28A0092B-C50C-407E-A947-70E740481C1C}">
-                <a14:useLocalDpi xmlns:a14="http://schemas.microsoft.com/office/drawing/2010/main" val="0"/>
-              </a:ext>
-            </a:extLst>
-          </a:blip>
+          <a:blip r:embed="rId2"/>
           <a:stretch>
             <a:fillRect/>
           </a:stretch>
         </p:blipFill>
         <p:spPr>
           <a:xfrm>
-            <a:off x="4127399" y="988291"/>
-            <a:ext cx="4628674" cy="4860517"/>
+            <a:off x="2638425" y="2739231"/>
+            <a:ext cx="6915150" cy="2524125"/>
           </a:xfrm>
           <a:prstGeom prst="rect">
             <a:avLst/>
@@ -6736,7 +6948,7 @@
     </p:spTree>
     <p:extLst>
       <p:ext uri="{BB962C8B-B14F-4D97-AF65-F5344CB8AC3E}">
-        <p14:creationId xmlns:p14="http://schemas.microsoft.com/office/powerpoint/2010/main" val="1804929264"/>
+        <p14:creationId xmlns:p14="http://schemas.microsoft.com/office/powerpoint/2010/main" val="2723685443"/>
       </p:ext>
     </p:extLst>
   </p:cSld>

</xml_diff>